<commit_message>
added more detailed information for idea and metric part
</commit_message>
<xml_diff>
--- a/slides/project_proposal_basic.pptx
+++ b/slides/project_proposal_basic.pptx
@@ -3425,7 +3425,7 @@
         <a:p>
           <a:r>
             <a:rPr lang="en-US" sz="2000" dirty="0" smtClean="0"/>
-            <a:t>Customer/Internal use cases</a:t>
+            <a:t>Requirements and use cases</a:t>
           </a:r>
           <a:endParaRPr lang="en-US" sz="2000" dirty="0"/>
         </a:p>
@@ -3499,7 +3499,7 @@
         <a:p>
           <a:r>
             <a:rPr lang="en-US" sz="2000" dirty="0" smtClean="0"/>
-            <a:t>Key ideas for value-add</a:t>
+            <a:t>Key ideas and high level design</a:t>
           </a:r>
           <a:endParaRPr lang="en-US" sz="2000" dirty="0"/>
         </a:p>
@@ -3573,11 +3573,7 @@
         <a:p>
           <a:r>
             <a:rPr lang="en-US" sz="2000" dirty="0" smtClean="0"/>
-            <a:t>Roadmap </a:t>
-          </a:r>
-          <a:r>
-            <a:rPr lang="en-US" sz="2000" dirty="0" smtClean="0"/>
-            <a:t>and ROI analysis</a:t>
+            <a:t>Roadmap and ROI analysis</a:t>
           </a:r>
           <a:endParaRPr lang="en-US" sz="2000" dirty="0"/>
         </a:p>
@@ -5316,7 +5312,7 @@
           </a:pPr>
           <a:r>
             <a:rPr lang="en-US" sz="2000" kern="1200" dirty="0" smtClean="0"/>
-            <a:t>Customer/Internal use cases</a:t>
+            <a:t>Requirements and use cases</a:t>
           </a:r>
           <a:endParaRPr lang="en-US" sz="2000" kern="1200" dirty="0"/>
         </a:p>
@@ -5470,7 +5466,7 @@
           </a:pPr>
           <a:r>
             <a:rPr lang="en-US" sz="2000" kern="1200" dirty="0" smtClean="0"/>
-            <a:t>Key ideas for value-add</a:t>
+            <a:t>Key ideas and high level design</a:t>
           </a:r>
           <a:endParaRPr lang="en-US" sz="2000" kern="1200" dirty="0"/>
         </a:p>
@@ -5624,11 +5620,7 @@
           </a:pPr>
           <a:r>
             <a:rPr lang="en-US" sz="2000" kern="1200" dirty="0" smtClean="0"/>
-            <a:t>Roadmap </a:t>
-          </a:r>
-          <a:r>
-            <a:rPr lang="en-US" sz="2000" kern="1200" dirty="0" smtClean="0"/>
-            <a:t>and ROI analysis</a:t>
+            <a:t>Roadmap and ROI analysis</a:t>
           </a:r>
           <a:endParaRPr lang="en-US" sz="2000" kern="1200" dirty="0"/>
         </a:p>
@@ -13159,6 +13151,351 @@
 </p:notes>
 </file>
 
+<file path=ppt/notesSlides/notesSlide3.xml><?xml version="1.0" encoding="utf-8"?>
+<p:notes xmlns:a="http://schemas.openxmlformats.org/drawingml/2006/main" xmlns:r="http://schemas.openxmlformats.org/officeDocument/2006/relationships" xmlns:p="http://schemas.openxmlformats.org/presentationml/2006/main">
+  <p:cSld>
+    <p:spTree>
+      <p:nvGrpSpPr>
+        <p:cNvPr id="1" name=""/>
+        <p:cNvGrpSpPr/>
+        <p:nvPr/>
+      </p:nvGrpSpPr>
+      <p:grpSpPr>
+        <a:xfrm>
+          <a:off x="0" y="0"/>
+          <a:ext cx="0" cy="0"/>
+          <a:chOff x="0" y="0"/>
+          <a:chExt cx="0" cy="0"/>
+        </a:xfrm>
+      </p:grpSpPr>
+      <p:sp>
+        <p:nvSpPr>
+          <p:cNvPr id="2" name="Slide Image Placeholder 1"/>
+          <p:cNvSpPr>
+            <a:spLocks noGrp="1" noRot="1" noChangeAspect="1"/>
+          </p:cNvSpPr>
+          <p:nvPr>
+            <p:ph type="sldImg"/>
+          </p:nvPr>
+        </p:nvSpPr>
+        <p:spPr/>
+      </p:sp>
+      <p:sp>
+        <p:nvSpPr>
+          <p:cNvPr id="3" name="Notes Placeholder 2"/>
+          <p:cNvSpPr>
+            <a:spLocks noGrp="1"/>
+          </p:cNvSpPr>
+          <p:nvPr>
+            <p:ph type="body" idx="1"/>
+          </p:nvPr>
+        </p:nvSpPr>
+        <p:spPr/>
+        <p:txBody>
+          <a:bodyPr/>
+          <a:lstStyle/>
+          <a:p>
+            <a:r>
+              <a:rPr lang="en-US" sz="1200" b="0" i="0" kern="1200" dirty="0" smtClean="0">
+                <a:solidFill>
+                  <a:schemeClr val="tx1"/>
+                </a:solidFill>
+                <a:effectLst/>
+                <a:latin typeface="+mn-lt"/>
+                <a:ea typeface="+mn-ea"/>
+                <a:cs typeface="+mn-cs"/>
+              </a:rPr>
+              <a:t>What is the high level design?</a:t>
+            </a:r>
+          </a:p>
+          <a:p>
+            <a:endParaRPr lang="en-US" sz="1200" b="0" i="0" kern="1200" dirty="0" smtClean="0">
+              <a:solidFill>
+                <a:schemeClr val="tx1"/>
+              </a:solidFill>
+              <a:effectLst/>
+              <a:latin typeface="+mn-lt"/>
+              <a:ea typeface="+mn-ea"/>
+              <a:cs typeface="+mn-cs"/>
+            </a:endParaRPr>
+          </a:p>
+          <a:p>
+            <a:pPr marL="171450" indent="-171450">
+              <a:buFont typeface="Arial" panose="020B0604020202020204" pitchFamily="34" charset="0"/>
+              <a:buChar char="•"/>
+            </a:pPr>
+            <a:r>
+              <a:rPr lang="en-US" sz="1200" b="0" i="0" kern="1200" dirty="0" smtClean="0">
+                <a:solidFill>
+                  <a:schemeClr val="tx1"/>
+                </a:solidFill>
+                <a:effectLst/>
+                <a:latin typeface="+mn-lt"/>
+                <a:ea typeface="+mn-ea"/>
+                <a:cs typeface="+mn-cs"/>
+              </a:rPr>
+              <a:t>Design </a:t>
+            </a:r>
+            <a:r>
+              <a:rPr lang="en-US" sz="1200" b="0" i="0" kern="1200" dirty="0" smtClean="0">
+                <a:solidFill>
+                  <a:schemeClr val="tx1"/>
+                </a:solidFill>
+                <a:effectLst/>
+                <a:latin typeface="+mn-lt"/>
+                <a:ea typeface="+mn-ea"/>
+                <a:cs typeface="+mn-cs"/>
+              </a:rPr>
+              <a:t>overview </a:t>
+            </a:r>
+            <a:r>
+              <a:rPr lang="en-US" sz="1200" b="0" i="0" kern="1200" dirty="0" smtClean="0">
+                <a:solidFill>
+                  <a:schemeClr val="tx1"/>
+                </a:solidFill>
+                <a:effectLst/>
+                <a:latin typeface="+mn-lt"/>
+                <a:ea typeface="+mn-ea"/>
+                <a:cs typeface="+mn-cs"/>
+              </a:rPr>
+              <a:t>- </a:t>
+            </a:r>
+            <a:r>
+              <a:rPr lang="en-US" sz="1200" b="0" i="0" kern="1200" dirty="0" smtClean="0">
+                <a:solidFill>
+                  <a:schemeClr val="tx1"/>
+                </a:solidFill>
+                <a:effectLst/>
+                <a:latin typeface="+mn-lt"/>
+                <a:ea typeface="+mn-ea"/>
+                <a:cs typeface="+mn-cs"/>
+              </a:rPr>
+              <a:t>As the project proceeds, the need is to provide an overview of how the various sub-systems and components of the system fit together</a:t>
+            </a:r>
+            <a:r>
+              <a:rPr lang="en-US" sz="1200" b="0" i="0" kern="1200" dirty="0" smtClean="0">
+                <a:solidFill>
+                  <a:schemeClr val="tx1"/>
+                </a:solidFill>
+                <a:effectLst/>
+                <a:latin typeface="+mn-lt"/>
+                <a:ea typeface="+mn-ea"/>
+                <a:cs typeface="+mn-cs"/>
+              </a:rPr>
+              <a:t>.</a:t>
+            </a:r>
+          </a:p>
+          <a:p>
+            <a:pPr marL="171450" marR="0" indent="-171450" algn="l" defTabSz="914400" rtl="0" eaLnBrk="1" fontAlgn="auto" latinLnBrk="0" hangingPunct="1">
+              <a:lnSpc>
+                <a:spcPct val="100000"/>
+              </a:lnSpc>
+              <a:spcBef>
+                <a:spcPts val="0"/>
+              </a:spcBef>
+              <a:spcAft>
+                <a:spcPts val="0"/>
+              </a:spcAft>
+              <a:buClrTx/>
+              <a:buSzTx/>
+              <a:buFont typeface="Arial" panose="020B0604020202020204" pitchFamily="34" charset="0"/>
+              <a:buChar char="•"/>
+              <a:tabLst/>
+              <a:defRPr/>
+            </a:pPr>
+            <a:r>
+              <a:rPr lang="en-US" sz="1200" b="0" i="0" kern="1200" dirty="0" smtClean="0">
+                <a:solidFill>
+                  <a:schemeClr val="tx1"/>
+                </a:solidFill>
+                <a:effectLst/>
+                <a:latin typeface="+mn-lt"/>
+                <a:ea typeface="+mn-ea"/>
+                <a:cs typeface="+mn-cs"/>
+              </a:rPr>
+              <a:t>Major application flow -</a:t>
+            </a:r>
+            <a:r>
+              <a:rPr lang="en-US" sz="1200" b="0" i="0" kern="1200" baseline="0" dirty="0" smtClean="0">
+                <a:solidFill>
+                  <a:schemeClr val="tx1"/>
+                </a:solidFill>
+                <a:effectLst/>
+                <a:latin typeface="+mn-lt"/>
+                <a:ea typeface="+mn-ea"/>
+                <a:cs typeface="+mn-cs"/>
+              </a:rPr>
+              <a:t> </a:t>
+            </a:r>
+            <a:r>
+              <a:rPr lang="en-US" sz="1200" b="0" i="0" kern="1200" dirty="0" smtClean="0">
+                <a:solidFill>
+                  <a:schemeClr val="tx1"/>
+                </a:solidFill>
+                <a:effectLst/>
+                <a:latin typeface="+mn-lt"/>
+                <a:ea typeface="+mn-ea"/>
+                <a:cs typeface="+mn-cs"/>
+              </a:rPr>
+              <a:t>Understand how system/component</a:t>
+            </a:r>
+            <a:r>
+              <a:rPr lang="en-US" sz="1200" b="0" i="0" kern="1200" baseline="0" dirty="0" smtClean="0">
+                <a:solidFill>
+                  <a:schemeClr val="tx1"/>
+                </a:solidFill>
+                <a:effectLst/>
+                <a:latin typeface="+mn-lt"/>
+                <a:ea typeface="+mn-ea"/>
+                <a:cs typeface="+mn-cs"/>
+              </a:rPr>
+              <a:t> works. What is the right behavior for major use case scenarios.</a:t>
+            </a:r>
+            <a:r>
+              <a:rPr lang="en-US" sz="1200" b="0" i="0" kern="1200" dirty="0" smtClean="0">
+                <a:solidFill>
+                  <a:schemeClr val="tx1"/>
+                </a:solidFill>
+                <a:effectLst/>
+                <a:latin typeface="+mn-lt"/>
+                <a:ea typeface="+mn-ea"/>
+                <a:cs typeface="+mn-cs"/>
+              </a:rPr>
+              <a:t> </a:t>
+            </a:r>
+          </a:p>
+          <a:p>
+            <a:pPr marL="171450" marR="0" indent="-171450" algn="l" defTabSz="914400" rtl="0" eaLnBrk="1" fontAlgn="auto" latinLnBrk="0" hangingPunct="1">
+              <a:lnSpc>
+                <a:spcPct val="100000"/>
+              </a:lnSpc>
+              <a:spcBef>
+                <a:spcPts val="0"/>
+              </a:spcBef>
+              <a:spcAft>
+                <a:spcPts val="0"/>
+              </a:spcAft>
+              <a:buClrTx/>
+              <a:buSzTx/>
+              <a:buFont typeface="Arial" panose="020B0604020202020204" pitchFamily="34" charset="0"/>
+              <a:buChar char="•"/>
+              <a:tabLst/>
+              <a:defRPr/>
+            </a:pPr>
+            <a:r>
+              <a:rPr lang="en-US" sz="1200" b="0" i="0" kern="1200" dirty="0" smtClean="0">
+                <a:solidFill>
+                  <a:schemeClr val="tx1"/>
+                </a:solidFill>
+                <a:effectLst/>
+                <a:latin typeface="+mn-lt"/>
+                <a:ea typeface="+mn-ea"/>
+                <a:cs typeface="+mn-cs"/>
+              </a:rPr>
+              <a:t>Key</a:t>
+            </a:r>
+            <a:r>
+              <a:rPr lang="en-US" sz="1200" b="0" i="0" kern="1200" baseline="0" dirty="0" smtClean="0">
+                <a:solidFill>
+                  <a:schemeClr val="tx1"/>
+                </a:solidFill>
+                <a:effectLst/>
+                <a:latin typeface="+mn-lt"/>
+                <a:ea typeface="+mn-ea"/>
+                <a:cs typeface="+mn-cs"/>
+              </a:rPr>
+              <a:t> challenge analysis - </a:t>
+            </a:r>
+            <a:r>
+              <a:rPr lang="en-US" sz="1200" b="0" i="0" kern="1200" dirty="0" smtClean="0">
+                <a:solidFill>
+                  <a:schemeClr val="tx1"/>
+                </a:solidFill>
+                <a:effectLst/>
+                <a:latin typeface="+mn-lt"/>
+                <a:ea typeface="+mn-ea"/>
+                <a:cs typeface="+mn-cs"/>
+              </a:rPr>
+              <a:t>Identify major challenge</a:t>
+            </a:r>
+            <a:r>
+              <a:rPr lang="en-US" sz="1200" b="0" i="0" kern="1200" baseline="0" dirty="0" smtClean="0">
+                <a:solidFill>
+                  <a:schemeClr val="tx1"/>
+                </a:solidFill>
+                <a:effectLst/>
+                <a:latin typeface="+mn-lt"/>
+                <a:ea typeface="+mn-ea"/>
+                <a:cs typeface="+mn-cs"/>
+              </a:rPr>
+              <a:t> and risks. </a:t>
+            </a:r>
+            <a:r>
+              <a:rPr lang="en-US" sz="1200" b="0" i="0" kern="1200" dirty="0" smtClean="0">
+                <a:solidFill>
+                  <a:schemeClr val="tx1"/>
+                </a:solidFill>
+                <a:effectLst/>
+                <a:latin typeface="+mn-lt"/>
+                <a:ea typeface="+mn-ea"/>
+                <a:cs typeface="+mn-cs"/>
+              </a:rPr>
+              <a:t>In the preliminary stages of a software development, the need is to size the project and to identify those parts of the project that might be risky or time consuming.</a:t>
+            </a:r>
+          </a:p>
+          <a:p>
+            <a:pPr marL="0" indent="0">
+              <a:buFont typeface="Arial" panose="020B0604020202020204" pitchFamily="34" charset="0"/>
+              <a:buNone/>
+            </a:pPr>
+            <a:endParaRPr lang="en-US" sz="1200" b="0" i="0" kern="1200" dirty="0" smtClean="0">
+              <a:solidFill>
+                <a:schemeClr val="tx1"/>
+              </a:solidFill>
+              <a:effectLst/>
+              <a:latin typeface="+mn-lt"/>
+              <a:ea typeface="+mn-ea"/>
+              <a:cs typeface="+mn-cs"/>
+            </a:endParaRPr>
+          </a:p>
+        </p:txBody>
+      </p:sp>
+      <p:sp>
+        <p:nvSpPr>
+          <p:cNvPr id="4" name="Slide Number Placeholder 3"/>
+          <p:cNvSpPr>
+            <a:spLocks noGrp="1"/>
+          </p:cNvSpPr>
+          <p:nvPr>
+            <p:ph type="sldNum" sz="quarter" idx="10"/>
+          </p:nvPr>
+        </p:nvSpPr>
+        <p:spPr/>
+        <p:txBody>
+          <a:bodyPr/>
+          <a:lstStyle/>
+          <a:p>
+            <a:fld id="{FB363E0F-7C1D-4065-B83B-25624FAFDA5D}" type="slidenum">
+              <a:rPr lang="en-US" smtClean="0"/>
+              <a:t>10</a:t>
+            </a:fld>
+            <a:endParaRPr lang="en-US"/>
+          </a:p>
+        </p:txBody>
+      </p:sp>
+    </p:spTree>
+    <p:extLst>
+      <p:ext uri="{BB962C8B-B14F-4D97-AF65-F5344CB8AC3E}">
+        <p14:creationId xmlns:p14="http://schemas.microsoft.com/office/powerpoint/2010/main" val="3745376502"/>
+      </p:ext>
+    </p:extLst>
+  </p:cSld>
+  <p:clrMapOvr>
+    <a:masterClrMapping/>
+  </p:clrMapOvr>
+</p:notes>
+</file>
+
 <file path=ppt/slideLayouts/slideLayout1.xml><?xml version="1.0" encoding="utf-8"?>
 <p:sldLayout xmlns:a="http://schemas.openxmlformats.org/drawingml/2006/main" xmlns:r="http://schemas.openxmlformats.org/officeDocument/2006/relationships" xmlns:p="http://schemas.openxmlformats.org/presentationml/2006/main" showMasterSp="0" type="title" preserve="1">
   <p:cSld name="Title Slide">
@@ -18132,11 +18469,7 @@
           <a:p>
             <a:r>
               <a:rPr lang="en-US" dirty="0" smtClean="0"/>
-              <a:t>				Oliver </a:t>
-            </a:r>
-            <a:r>
-              <a:rPr lang="en-US" dirty="0" smtClean="0"/>
-              <a:t>Yang</a:t>
+              <a:t>				Oliver Yang</a:t>
             </a:r>
           </a:p>
           <a:p>
@@ -18146,19 +18479,7 @@
             </a:r>
             <a:r>
               <a:rPr lang="en-US" dirty="0" smtClean="0"/>
-              <a:t>                                                       </a:t>
-            </a:r>
-            <a:r>
-              <a:rPr lang="en-US" dirty="0" smtClean="0"/>
-              <a:t>Jan</a:t>
-            </a:r>
-            <a:r>
-              <a:rPr lang="en-US" dirty="0" smtClean="0"/>
-              <a:t>, </a:t>
-            </a:r>
-            <a:r>
-              <a:rPr lang="en-US" dirty="0" smtClean="0"/>
-              <a:t>2016</a:t>
+              <a:t>                                                       Jan, 2016</a:t>
             </a:r>
           </a:p>
           <a:p>
@@ -18247,7 +18568,7 @@
         <p:spPr/>
         <p:txBody>
           <a:bodyPr>
-            <a:normAutofit/>
+            <a:normAutofit fontScale="92500" lnSpcReduction="10000"/>
           </a:bodyPr>
           <a:lstStyle/>
           <a:p>
@@ -18271,67 +18592,92 @@
             </a:r>
           </a:p>
           <a:p>
+            <a:pPr lvl="1"/>
             <a:r>
               <a:rPr lang="en-US" dirty="0"/>
-              <a:t>K</a:t>
+              <a:t>What is value-add for the key idea?</a:t>
+            </a:r>
+          </a:p>
+          <a:p>
+            <a:pPr lvl="1"/>
+            <a:r>
+              <a:rPr lang="en-US" dirty="0"/>
+              <a:t>Any alternative options?</a:t>
+            </a:r>
+          </a:p>
+          <a:p>
+            <a:pPr lvl="2"/>
+            <a:r>
+              <a:rPr lang="en-US" dirty="0"/>
+              <a:t>Pros vs. Cons among different options</a:t>
+            </a:r>
+          </a:p>
+          <a:p>
+            <a:pPr lvl="2"/>
+            <a:r>
+              <a:rPr lang="en-US" dirty="0"/>
+              <a:t>Why choose current solution</a:t>
+            </a:r>
+          </a:p>
+          <a:p>
+            <a:r>
+              <a:rPr lang="en-US" dirty="0" smtClean="0"/>
+              <a:t>High level design</a:t>
+            </a:r>
+          </a:p>
+          <a:p>
+            <a:pPr lvl="1"/>
+            <a:r>
+              <a:rPr lang="en-US" dirty="0" smtClean="0"/>
+              <a:t>Solution/Product/Component architecture diagram</a:t>
+            </a:r>
+          </a:p>
+          <a:p>
+            <a:pPr lvl="2"/>
+            <a:r>
+              <a:rPr lang="en-US" dirty="0" smtClean="0"/>
+              <a:t>How various sub-system or components fit together</a:t>
+            </a:r>
+          </a:p>
+          <a:p>
+            <a:pPr lvl="1"/>
+            <a:r>
+              <a:rPr lang="en-US" dirty="0" smtClean="0"/>
+              <a:t>Major application flow</a:t>
+            </a:r>
+          </a:p>
+          <a:p>
+            <a:pPr lvl="2"/>
+            <a:r>
+              <a:rPr lang="en-US" dirty="0" smtClean="0"/>
+              <a:t>Data </a:t>
             </a:r>
             <a:r>
               <a:rPr lang="en-US" dirty="0" smtClean="0"/>
-              <a:t>ey challenges analysis</a:t>
+              <a:t>path, Control path, error handling</a:t>
             </a:r>
+            <a:endParaRPr lang="en-US" dirty="0" smtClean="0"/>
           </a:p>
           <a:p>
             <a:pPr lvl="1"/>
+            <a:r>
+              <a:rPr lang="en-US" dirty="0" smtClean="0"/>
+              <a:t>Key challenges analysis</a:t>
+            </a:r>
+          </a:p>
+          <a:p>
+            <a:pPr lvl="2"/>
             <a:r>
               <a:rPr lang="en-US" dirty="0" smtClean="0"/>
               <a:t>What are the key challenges</a:t>
             </a:r>
           </a:p>
           <a:p>
-            <a:pPr lvl="1"/>
+            <a:pPr lvl="2"/>
             <a:r>
               <a:rPr lang="en-US" dirty="0" smtClean="0"/>
               <a:t>Any prototype/validation need to be planned</a:t>
             </a:r>
-          </a:p>
-          <a:p>
-            <a:r>
-              <a:rPr lang="en-US" dirty="0" smtClean="0"/>
-              <a:t>Value-add analysis</a:t>
-            </a:r>
-          </a:p>
-          <a:p>
-            <a:pPr lvl="1"/>
-            <a:r>
-              <a:rPr lang="en-US" dirty="0" smtClean="0"/>
-              <a:t>What is value-add for the key idea?</a:t>
-            </a:r>
-          </a:p>
-          <a:p>
-            <a:pPr lvl="1"/>
-            <a:r>
-              <a:rPr lang="en-US" dirty="0" smtClean="0"/>
-              <a:t>Any alternative options?</a:t>
-            </a:r>
-          </a:p>
-          <a:p>
-            <a:pPr lvl="2"/>
-            <a:r>
-              <a:rPr lang="en-US" dirty="0" smtClean="0"/>
-              <a:t>Pros vs. Cons among different options</a:t>
-            </a:r>
-          </a:p>
-          <a:p>
-            <a:pPr lvl="2"/>
-            <a:r>
-              <a:rPr lang="en-US" dirty="0"/>
-              <a:t>Why choose current </a:t>
-            </a:r>
-            <a:r>
-              <a:rPr lang="en-US" dirty="0" smtClean="0"/>
-              <a:t>solution</a:t>
-            </a:r>
-            <a:endParaRPr lang="en-US" dirty="0"/>
           </a:p>
         </p:txBody>
       </p:sp>
@@ -18421,11 +18767,7 @@
             <a:pPr lvl="1"/>
             <a:r>
               <a:rPr lang="en-US" dirty="0" smtClean="0"/>
-              <a:t>Deliverable </a:t>
-            </a:r>
-            <a:r>
-              <a:rPr lang="en-US" dirty="0" smtClean="0"/>
-              <a:t>definitions</a:t>
+              <a:t>Deliverable definitions</a:t>
             </a:r>
           </a:p>
           <a:p>
@@ -18538,17 +18880,12 @@
               <a:rPr lang="en-US" dirty="0" smtClean="0"/>
               <a:t>Investment analysis</a:t>
             </a:r>
-            <a:endParaRPr lang="en-US" dirty="0" smtClean="0"/>
           </a:p>
           <a:p>
             <a:pPr lvl="2"/>
             <a:r>
               <a:rPr lang="en-US" dirty="0" smtClean="0"/>
-              <a:t>Project </a:t>
-            </a:r>
-            <a:r>
-              <a:rPr lang="en-US" dirty="0" smtClean="0"/>
-              <a:t>contributors and sponsors</a:t>
+              <a:t>Project contributors and sponsors</a:t>
             </a:r>
           </a:p>
           <a:p>
@@ -18788,7 +19125,7 @@
           <p:nvPr>
             <p:extLst>
               <p:ext uri="{D42A27DB-BD31-4B8C-83A1-F6EECF244321}">
-                <p14:modId xmlns:p14="http://schemas.microsoft.com/office/powerpoint/2010/main" val="4289455722"/>
+                <p14:modId xmlns:p14="http://schemas.microsoft.com/office/powerpoint/2010/main" val="1994579957"/>
               </p:ext>
             </p:extLst>
           </p:nvPr>
@@ -19620,7 +19957,11 @@
           <a:p>
             <a:r>
               <a:rPr lang="en-US" dirty="0" smtClean="0"/>
-              <a:t>Idea Review for early investigation</a:t>
+              <a:t>Idea Review </a:t>
+            </a:r>
+            <a:r>
+              <a:rPr lang="en-US" dirty="0" smtClean="0"/>
+              <a:t>And Discussion</a:t>
             </a:r>
             <a:endParaRPr lang="en-US" dirty="0"/>
           </a:p>
@@ -20577,7 +20918,7 @@
             <a:pPr lvl="1"/>
             <a:r>
               <a:rPr lang="en-US" dirty="0" smtClean="0"/>
-              <a:t>Proposal documents</a:t>
+              <a:t>Proposal documents and references</a:t>
             </a:r>
           </a:p>
           <a:p>
@@ -20857,11 +21198,7 @@
             <a:pPr lvl="1"/>
             <a:r>
               <a:rPr lang="en-US" dirty="0" smtClean="0"/>
-              <a:t>Use </a:t>
-            </a:r>
-            <a:r>
-              <a:rPr lang="en-US" dirty="0" smtClean="0"/>
-              <a:t>case </a:t>
+              <a:t>Use case </a:t>
             </a:r>
             <a:r>
               <a:rPr lang="en-US" dirty="0"/>
@@ -20871,7 +21208,6 @@
               <a:rPr lang="en-US" dirty="0" smtClean="0"/>
               <a:t>ype</a:t>
             </a:r>
-            <a:endParaRPr lang="en-US" dirty="0" smtClean="0"/>
           </a:p>
           <a:p>
             <a:pPr lvl="2"/>
@@ -20918,13 +21254,8 @@
             <a:pPr lvl="1"/>
             <a:r>
               <a:rPr lang="en-US" dirty="0" smtClean="0"/>
-              <a:t>Can this new proposal be aligned with company </a:t>
+              <a:t>Can this new proposal be aligned with company big strategy</a:t>
             </a:r>
-            <a:r>
-              <a:rPr lang="en-US" dirty="0" smtClean="0"/>
-              <a:t>big strategy</a:t>
-            </a:r>
-            <a:endParaRPr lang="en-US" dirty="0" smtClean="0"/>
           </a:p>
           <a:p>
             <a:pPr lvl="1"/>

</xml_diff>

<commit_message>
Minor updates in story section per self-review
</commit_message>
<xml_diff>
--- a/slides/project_proposal_basic.pptx
+++ b/slides/project_proposal_basic.pptx
@@ -13599,11 +13599,7 @@
             </a:r>
             <a:r>
               <a:rPr lang="en-US" baseline="0" dirty="0" smtClean="0"/>
-              <a:t> </a:t>
-            </a:r>
-            <a:r>
-              <a:rPr lang="en-US" baseline="0" dirty="0" smtClean="0"/>
-              <a:t>analysis:</a:t>
+              <a:t> analysis:</a:t>
             </a:r>
           </a:p>
           <a:p>
@@ -18842,11 +18838,7 @@
             <a:pPr lvl="2"/>
             <a:r>
               <a:rPr lang="en-US" dirty="0" smtClean="0"/>
-              <a:t>Any prototype/validation need to be </a:t>
-            </a:r>
-            <a:r>
-              <a:rPr lang="en-US" dirty="0" smtClean="0"/>
-              <a:t>planned</a:t>
+              <a:t>Any prototype/validation need to be planned</a:t>
             </a:r>
           </a:p>
           <a:p>
@@ -18868,7 +18860,6 @@
               <a:rPr lang="en-US" dirty="0" smtClean="0"/>
               <a:t>Address their concerns</a:t>
             </a:r>
-            <a:endParaRPr lang="en-US" dirty="0" smtClean="0"/>
           </a:p>
         </p:txBody>
       </p:sp>
@@ -19049,15 +19040,7 @@
             <a:pPr lvl="2"/>
             <a:r>
               <a:rPr lang="en-US" dirty="0" smtClean="0"/>
-              <a:t>Full</a:t>
-            </a:r>
-            <a:r>
-              <a:rPr lang="en-US" dirty="0" smtClean="0"/>
-              <a:t> Stakeholders list </a:t>
-            </a:r>
-            <a:r>
-              <a:rPr lang="en-US" dirty="0" smtClean="0"/>
-              <a:t>per milestones</a:t>
+              <a:t>Full Stakeholders list per milestones</a:t>
             </a:r>
           </a:p>
           <a:p>
@@ -19091,11 +19074,7 @@
             <a:pPr lvl="2"/>
             <a:r>
               <a:rPr lang="en-US" dirty="0" smtClean="0"/>
-              <a:t>Rough </a:t>
-            </a:r>
-            <a:r>
-              <a:rPr lang="en-US" dirty="0" smtClean="0"/>
-              <a:t>estimation for people/month (optional)</a:t>
+              <a:t>Rough estimation for people/month (optional)</a:t>
             </a:r>
           </a:p>
           <a:p>
@@ -21343,150 +21322,208 @@
         <p:spPr/>
         <p:txBody>
           <a:bodyPr>
-            <a:normAutofit fontScale="70000" lnSpcReduction="20000"/>
+            <a:normAutofit fontScale="25000" lnSpcReduction="20000"/>
           </a:bodyPr>
           <a:lstStyle/>
           <a:p>
             <a:r>
-              <a:rPr lang="en-US" dirty="0" smtClean="0"/>
+              <a:rPr lang="en-US" sz="6400" dirty="0" smtClean="0"/>
               <a:t>Requirements Definition</a:t>
             </a:r>
           </a:p>
           <a:p>
             <a:pPr lvl="1"/>
             <a:r>
-              <a:rPr lang="en-US" dirty="0" smtClean="0"/>
+              <a:rPr lang="en-US" sz="6400" dirty="0" smtClean="0"/>
               <a:t>Type: Solution/Product/Component level</a:t>
             </a:r>
           </a:p>
           <a:p>
             <a:pPr lvl="1"/>
             <a:r>
-              <a:rPr lang="en-US" dirty="0" smtClean="0"/>
+              <a:rPr lang="en-US" sz="6400" dirty="0" smtClean="0"/>
               <a:t>User story for user/business problems or  requirements</a:t>
             </a:r>
           </a:p>
           <a:p>
             <a:pPr lvl="2"/>
             <a:r>
-              <a:rPr lang="en-US" dirty="0" smtClean="0"/>
+              <a:rPr lang="en-US" sz="5600" dirty="0" smtClean="0"/>
               <a:t>Focus problems, pain points from customer or business view</a:t>
             </a:r>
           </a:p>
           <a:p>
             <a:pPr lvl="2"/>
             <a:r>
-              <a:rPr lang="en-US" dirty="0" smtClean="0"/>
+              <a:rPr lang="en-US" sz="5600" dirty="0" smtClean="0"/>
               <a:t>Or just focus on direct customer or business requirements</a:t>
             </a:r>
           </a:p>
           <a:p>
             <a:pPr lvl="1"/>
             <a:r>
-              <a:rPr lang="en-US" dirty="0" smtClean="0"/>
+              <a:rPr lang="en-US" sz="6400" dirty="0" smtClean="0"/>
               <a:t>Non-requirements definition</a:t>
             </a:r>
           </a:p>
           <a:p>
             <a:r>
-              <a:rPr lang="en-US" dirty="0" smtClean="0"/>
-              <a:t>Use Case Definition</a:t>
+              <a:rPr lang="en-US" sz="6400" dirty="0"/>
+              <a:t>Solution to address user requirements or problems</a:t>
             </a:r>
           </a:p>
           <a:p>
             <a:pPr lvl="1"/>
             <a:r>
-              <a:rPr lang="en-US" dirty="0" smtClean="0"/>
-              <a:t>Use case </a:t>
+              <a:rPr lang="en-US" sz="6400" dirty="0"/>
+              <a:t>High level brief description, from user </a:t>
             </a:r>
             <a:r>
-              <a:rPr lang="en-US" dirty="0"/>
+              <a:rPr lang="en-US" sz="6400" dirty="0" smtClean="0"/>
+              <a:t>perspective</a:t>
+            </a:r>
+          </a:p>
+          <a:p>
+            <a:pPr lvl="1"/>
+            <a:r>
+              <a:rPr lang="en-US" sz="6600" dirty="0"/>
+              <a:t>How customer get benefits from </a:t>
+            </a:r>
+            <a:r>
+              <a:rPr lang="en-US" sz="6600" dirty="0" smtClean="0"/>
+              <a:t>the solution</a:t>
+            </a:r>
+            <a:endParaRPr lang="en-US" sz="6600" dirty="0"/>
+          </a:p>
+          <a:p>
+            <a:pPr lvl="1"/>
+            <a:r>
+              <a:rPr lang="en-US" sz="6100" dirty="0" smtClean="0"/>
+              <a:t>Use </a:t>
+            </a:r>
+            <a:r>
+              <a:rPr lang="en-US" sz="6100" dirty="0" smtClean="0"/>
+              <a:t>Case Definition</a:t>
+            </a:r>
+          </a:p>
+          <a:p>
+            <a:pPr lvl="2"/>
+            <a:r>
+              <a:rPr lang="en-US" sz="6100" dirty="0" smtClean="0"/>
+              <a:t>Use </a:t>
+            </a:r>
+            <a:r>
+              <a:rPr lang="en-US" sz="6100" dirty="0" smtClean="0"/>
+              <a:t>case </a:t>
+            </a:r>
+            <a:r>
+              <a:rPr lang="en-US" sz="6100" dirty="0"/>
               <a:t>t</a:t>
             </a:r>
             <a:r>
-              <a:rPr lang="en-US" dirty="0" smtClean="0"/>
+              <a:rPr lang="en-US" sz="6100" dirty="0" smtClean="0"/>
               <a:t>ype</a:t>
             </a:r>
           </a:p>
           <a:p>
+            <a:pPr lvl="3"/>
+            <a:r>
+              <a:rPr lang="en-US" sz="5600" dirty="0" smtClean="0"/>
+              <a:t>New use case vs. Existing new case</a:t>
+            </a:r>
+          </a:p>
+          <a:p>
+            <a:pPr lvl="3"/>
+            <a:r>
+              <a:rPr lang="en-US" sz="5600" dirty="0" smtClean="0"/>
+              <a:t>Customer use case vs. Internal use case</a:t>
+            </a:r>
+          </a:p>
+          <a:p>
             <a:pPr lvl="2"/>
             <a:r>
-              <a:rPr lang="en-US" dirty="0" smtClean="0"/>
-              <a:t>New use case vs. Existing new case</a:t>
+              <a:rPr lang="en-US" sz="6100" dirty="0" smtClean="0"/>
+              <a:t>Use </a:t>
             </a:r>
-          </a:p>
-          <a:p>
-            <a:pPr lvl="2"/>
             <a:r>
-              <a:rPr lang="en-US" dirty="0" smtClean="0"/>
-              <a:t>Customer use case vs. Internal use case</a:t>
+              <a:rPr lang="en-US" sz="6100" dirty="0" smtClean="0"/>
+              <a:t>case </a:t>
+            </a:r>
+            <a:r>
+              <a:rPr lang="en-US" sz="6100" dirty="0" smtClean="0"/>
+              <a:t>brief description</a:t>
+            </a:r>
+          </a:p>
+          <a:p>
+            <a:pPr lvl="3"/>
+            <a:r>
+              <a:rPr lang="en-US" sz="5600" dirty="0" smtClean="0"/>
+              <a:t>Focus on how customer interactive with the new use case</a:t>
+            </a:r>
+          </a:p>
+          <a:p>
+            <a:r>
+              <a:rPr lang="en-US" sz="6400" dirty="0" smtClean="0"/>
+              <a:t>Market </a:t>
+            </a:r>
+            <a:r>
+              <a:rPr lang="en-US" sz="6400" dirty="0" smtClean="0"/>
+              <a:t>analysis – (optional for component proposal)</a:t>
             </a:r>
           </a:p>
           <a:p>
             <a:pPr lvl="1"/>
             <a:r>
-              <a:rPr lang="en-US" dirty="0" smtClean="0"/>
-              <a:t>Use case brief description</a:t>
-            </a:r>
-          </a:p>
-          <a:p>
-            <a:pPr lvl="2"/>
-            <a:r>
-              <a:rPr lang="en-US" dirty="0" smtClean="0"/>
-              <a:t>Focus on how customer interactive with the new use case</a:t>
-            </a:r>
-          </a:p>
-          <a:p>
-            <a:pPr lvl="2"/>
-            <a:r>
-              <a:rPr lang="en-US" dirty="0" smtClean="0"/>
-              <a:t>How customer get benefits from existing use case</a:t>
-            </a:r>
-          </a:p>
-          <a:p>
-            <a:r>
-              <a:rPr lang="en-US" dirty="0" smtClean="0"/>
-              <a:t>Solution to address user requirements or problems</a:t>
+              <a:rPr lang="en-US" sz="6400" dirty="0" smtClean="0"/>
+              <a:t>Current market status</a:t>
             </a:r>
           </a:p>
           <a:p>
             <a:pPr lvl="1"/>
             <a:r>
-              <a:rPr lang="en-US" dirty="0" smtClean="0"/>
-              <a:t>High level brief description, from user perspective</a:t>
+              <a:rPr lang="en-US" sz="6400" dirty="0" smtClean="0"/>
+              <a:t>Who </a:t>
             </a:r>
-          </a:p>
-          <a:p>
             <a:r>
-              <a:rPr lang="en-US" dirty="0" smtClean="0"/>
-              <a:t>Market analysis – (optional for component proposal)</a:t>
+              <a:rPr lang="en-US" sz="6400" dirty="0" smtClean="0"/>
+              <a:t>are</a:t>
+            </a:r>
+            <a:r>
+              <a:rPr lang="en-US" sz="6400" dirty="0" smtClean="0"/>
+              <a:t> </a:t>
+            </a:r>
+            <a:r>
+              <a:rPr lang="en-US" sz="6400" dirty="0" smtClean="0"/>
+              <a:t>the major </a:t>
+            </a:r>
+            <a:r>
+              <a:rPr lang="en-US" sz="6400" dirty="0" smtClean="0"/>
+              <a:t>competitors </a:t>
+            </a:r>
+            <a:r>
+              <a:rPr lang="en-US" sz="6400" dirty="0" smtClean="0"/>
+              <a:t>in the </a:t>
+            </a:r>
+            <a:r>
+              <a:rPr lang="en-US" sz="6400" dirty="0" smtClean="0"/>
+              <a:t>market</a:t>
             </a:r>
           </a:p>
           <a:p>
             <a:pPr lvl="1"/>
             <a:r>
-              <a:rPr lang="en-US" dirty="0" smtClean="0"/>
-              <a:t>Current market status</a:t>
-            </a:r>
-          </a:p>
-          <a:p>
-            <a:pPr lvl="1"/>
-            <a:r>
-              <a:rPr lang="en-US" dirty="0" smtClean="0"/>
+              <a:rPr lang="en-US" sz="6400" dirty="0"/>
               <a:t>Can this new proposal be aligned with company big strategy</a:t>
             </a:r>
           </a:p>
           <a:p>
-            <a:pPr lvl="1"/>
             <a:r>
-              <a:rPr lang="en-US" dirty="0" smtClean="0"/>
-              <a:t>Who is the major competitor in the market</a:t>
+              <a:rPr lang="en-US" sz="6400" dirty="0" smtClean="0"/>
+              <a:t>Identify </a:t>
             </a:r>
-          </a:p>
-          <a:p>
             <a:r>
-              <a:rPr lang="en-US" dirty="0" smtClean="0"/>
-              <a:t>Identify and get your core contributors, project sponsors or advocates</a:t>
+              <a:rPr lang="en-US" sz="6400" dirty="0" smtClean="0"/>
+              <a:t>and get your core contributors, project sponsors or advocates</a:t>
             </a:r>
           </a:p>
           <a:p>

</xml_diff>